<commit_message>
APS talk small tweaks
</commit_message>
<xml_diff>
--- a/APS_conf/slides.pptx
+++ b/APS_conf/slides.pptx
@@ -5970,8 +5970,8 @@
           </a:p>
         </p:txBody>
       </p:sp>
-      <mc:AlternateContent xmlns:mc="http://schemas.openxmlformats.org/markup-compatibility/2006">
-        <mc:Choice xmlns:a14="http://schemas.microsoft.com/office/drawing/2010/main" Requires="a14">
+      <mc:AlternateContent xmlns:mc="http://schemas.openxmlformats.org/markup-compatibility/2006" xmlns:a14="http://schemas.microsoft.com/office/drawing/2010/main">
+        <mc:Choice Requires="a14">
           <p:sp>
             <p:nvSpPr>
               <p:cNvPr id="6" name="Content Placeholder 5">
@@ -6703,7 +6703,7 @@
             </p:txBody>
           </p:sp>
         </mc:Choice>
-        <mc:Fallback>
+        <mc:Fallback xmlns="">
           <p:sp>
             <p:nvSpPr>
               <p:cNvPr id="6" name="Content Placeholder 5">
@@ -8921,8 +8921,8 @@
           </a:p>
         </p:txBody>
       </p:sp>
-      <mc:AlternateContent xmlns:mc="http://schemas.openxmlformats.org/markup-compatibility/2006">
-        <mc:Choice xmlns:a14="http://schemas.microsoft.com/office/drawing/2010/main" Requires="a14">
+      <mc:AlternateContent xmlns:mc="http://schemas.openxmlformats.org/markup-compatibility/2006" xmlns:a14="http://schemas.microsoft.com/office/drawing/2010/main">
+        <mc:Choice Requires="a14">
           <p:sp>
             <p:nvSpPr>
               <p:cNvPr id="3" name="Content Placeholder 2">
@@ -9213,7 +9213,7 @@
             </p:txBody>
           </p:sp>
         </mc:Choice>
-        <mc:Fallback>
+        <mc:Fallback xmlns="">
           <p:sp>
             <p:nvSpPr>
               <p:cNvPr id="3" name="Content Placeholder 2">
@@ -9709,7 +9709,7 @@
           <a:p>
             <a:r>
               <a:rPr lang="en-US" dirty="0"/>
-              <a:t>Problems</a:t>
+              <a:t>Problems with dynamic slipping</a:t>
             </a:r>
           </a:p>
         </p:txBody>
@@ -9753,36 +9753,6 @@
           </a:p>
         </p:txBody>
       </p:sp>
-      <p:pic>
-        <p:nvPicPr>
-          <p:cNvPr id="5" name="Picture 4">
-            <a:extLst>
-              <a:ext uri="{FF2B5EF4-FFF2-40B4-BE49-F238E27FC236}">
-                <a16:creationId xmlns:a16="http://schemas.microsoft.com/office/drawing/2014/main" id="{CD0C5C28-AA30-439C-A145-FD053DCAF2BB}"/>
-              </a:ext>
-            </a:extLst>
-          </p:cNvPr>
-          <p:cNvPicPr>
-            <a:picLocks noChangeAspect="1"/>
-          </p:cNvPicPr>
-          <p:nvPr/>
-        </p:nvPicPr>
-        <p:blipFill>
-          <a:blip r:embed="rId2"/>
-          <a:stretch>
-            <a:fillRect/>
-          </a:stretch>
-        </p:blipFill>
-        <p:spPr>
-          <a:xfrm>
-            <a:off x="6426679" y="1322717"/>
-            <a:ext cx="5681932" cy="4971690"/>
-          </a:xfrm>
-          <a:prstGeom prst="rect">
-            <a:avLst/>
-          </a:prstGeom>
-        </p:spPr>
-      </p:pic>
     </p:spTree>
     <p:extLst>
       <p:ext uri="{BB962C8B-B14F-4D97-AF65-F5344CB8AC3E}">
@@ -11490,8 +11460,8 @@
           </a:p>
         </p:txBody>
       </p:sp>
-      <mc:AlternateContent xmlns:mc="http://schemas.openxmlformats.org/markup-compatibility/2006">
-        <mc:Choice xmlns:a14="http://schemas.microsoft.com/office/drawing/2010/main" Requires="a14">
+      <mc:AlternateContent xmlns:mc="http://schemas.openxmlformats.org/markup-compatibility/2006" xmlns:a14="http://schemas.microsoft.com/office/drawing/2010/main">
+        <mc:Choice Requires="a14">
           <p:sp>
             <p:nvSpPr>
               <p:cNvPr id="3" name="Content Placeholder 2">
@@ -11583,7 +11553,7 @@
             </p:txBody>
           </p:sp>
         </mc:Choice>
-        <mc:Fallback>
+        <mc:Fallback xmlns="">
           <p:sp>
             <p:nvSpPr>
               <p:cNvPr id="3" name="Content Placeholder 2">
@@ -13038,7 +13008,7 @@
           <a:p>
             <a:r>
               <a:rPr lang="en-US" dirty="0"/>
-              <a:t>Notice that the total force on one marker is always normal to the interface. </a:t>
+              <a:t>Note that the total force on one marker is always normal to the interface. </a:t>
             </a:r>
           </a:p>
         </p:txBody>
@@ -14957,8 +14927,8 @@
           </a:p>
         </p:txBody>
       </p:sp>
-      <mc:AlternateContent xmlns:mc="http://schemas.openxmlformats.org/markup-compatibility/2006">
-        <mc:Choice xmlns:a14="http://schemas.microsoft.com/office/drawing/2010/main" Requires="a14">
+      <mc:AlternateContent xmlns:mc="http://schemas.openxmlformats.org/markup-compatibility/2006" xmlns:a14="http://schemas.microsoft.com/office/drawing/2010/main">
+        <mc:Choice Requires="a14">
           <p:sp>
             <p:nvSpPr>
               <p:cNvPr id="3" name="Content Placeholder 2">
@@ -15039,7 +15009,7 @@
             </p:txBody>
           </p:sp>
         </mc:Choice>
-        <mc:Fallback>
+        <mc:Fallback xmlns="">
           <p:sp>
             <p:nvSpPr>
               <p:cNvPr id="3" name="Content Placeholder 2">

</xml_diff>